<commit_message>
Update 02.3 Implicit Intents.pptx
</commit_message>
<xml_diff>
--- a/Presentation/Android Developer Fundamentals/Unit1/02.3 Implicit Intents.pptx
+++ b/Presentation/Android Developer Fundamentals/Unit1/02.3 Implicit Intents.pptx
@@ -54,22 +54,22 @@
   <p:notesSz cx="6858000" cy="9144000"/>
   <p:embeddedFontLst>
     <p:embeddedFont>
-      <p:font typeface="Roboto" panose="02000000000000000000" pitchFamily="2" charset="0"/>
+      <p:font typeface="Consolas" panose="020B0609020204030204" pitchFamily="49" charset="0"/>
       <p:regular r:id="rId44"/>
+      <p:bold r:id="rId45"/>
+      <p:italic r:id="rId46"/>
+      <p:boldItalic r:id="rId47"/>
     </p:embeddedFont>
     <p:embeddedFont>
       <p:font typeface="Open Sans" panose="020B0606030504020204" pitchFamily="34" charset="0"/>
-      <p:regular r:id="rId45"/>
-      <p:bold r:id="rId46"/>
-      <p:italic r:id="rId47"/>
-      <p:boldItalic r:id="rId48"/>
+      <p:regular r:id="rId48"/>
+      <p:bold r:id="rId49"/>
+      <p:italic r:id="rId50"/>
+      <p:boldItalic r:id="rId51"/>
     </p:embeddedFont>
     <p:embeddedFont>
-      <p:font typeface="Consolas" panose="020B0609020204030204" pitchFamily="49" charset="0"/>
-      <p:regular r:id="rId49"/>
-      <p:bold r:id="rId50"/>
-      <p:italic r:id="rId51"/>
-      <p:boldItalic r:id="rId52"/>
+      <p:font typeface="Roboto" panose="02000000000000000000" pitchFamily="2" charset="0"/>
+      <p:regular r:id="rId52"/>
     </p:embeddedFont>
   </p:embeddedFontLst>
   <p:defaultTextStyle>
@@ -301,6 +301,11 @@
       </a:defRPr>
     </a:lvl9pPr>
   </p:defaultTextStyle>
+  <p:extLst>
+    <p:ext uri="{EFAFB233-063F-42B5-8137-9DF3F51BA10A}">
+      <p15:sldGuideLst xmlns:p15="http://schemas.microsoft.com/office/powerpoint/2012/main"/>
+    </p:ext>
+  </p:extLst>
 </p:presentation>
 </file>
 
@@ -1322,7 +1327,7 @@
         </p:nvSpPr>
         <p:spPr>
           <a:xfrm>
-            <a:off x="381300" y="685800"/>
+            <a:off x="381000" y="685800"/>
             <a:ext cx="6096000" cy="3429000"/>
           </a:xfrm>
           <a:custGeom>
@@ -1540,7 +1545,7 @@
         </p:nvSpPr>
         <p:spPr>
           <a:xfrm>
-            <a:off x="381300" y="685800"/>
+            <a:off x="381000" y="685800"/>
             <a:ext cx="6096000" cy="3429000"/>
           </a:xfrm>
           <a:custGeom>
@@ -1867,7 +1872,7 @@
         </p:nvSpPr>
         <p:spPr>
           <a:xfrm>
-            <a:off x="381300" y="685800"/>
+            <a:off x="381000" y="685800"/>
             <a:ext cx="6096000" cy="3429000"/>
           </a:xfrm>
           <a:custGeom>
@@ -2194,7 +2199,7 @@
         </p:nvSpPr>
         <p:spPr>
           <a:xfrm>
-            <a:off x="381300" y="685800"/>
+            <a:off x="381000" y="685800"/>
             <a:ext cx="6096000" cy="3429000"/>
           </a:xfrm>
           <a:custGeom>
@@ -47876,13 +47881,6 @@
   <p:clrMapOvr>
     <a:masterClrMapping/>
   </p:clrMapOvr>
-  <p:timing>
-    <p:tnLst>
-      <p:par>
-        <p:cTn id="1" dur="indefinite" restart="never" nodeType="tmRoot"/>
-      </p:par>
-    </p:tnLst>
-  </p:timing>
 </p:sld>
 </file>
 
@@ -48797,7 +48795,7 @@
               <a:buAutoNum type="arabicPeriod"/>
             </a:pPr>
             <a:r>
-              <a:rPr lang="en" sz="2400">
+              <a:rPr lang="en" sz="2400" dirty="0">
                 <a:latin typeface="Roboto"/>
                 <a:ea typeface="Roboto"/>
                 <a:cs typeface="Roboto"/>
@@ -48805,7 +48803,7 @@
               </a:rPr>
               <a:t>Create an Intent for an action</a:t>
             </a:r>
-            <a:endParaRPr sz="2400">
+            <a:endParaRPr sz="2400" dirty="0">
               <a:latin typeface="Roboto"/>
               <a:ea typeface="Roboto"/>
               <a:cs typeface="Roboto"/>
@@ -48826,7 +48824,7 @@
               <a:buNone/>
             </a:pPr>
             <a:r>
-              <a:rPr lang="en" sz="1800">
+              <a:rPr lang="en" sz="1800" dirty="0">
                 <a:solidFill>
                   <a:schemeClr val="dk1"/>
                 </a:solidFill>
@@ -48838,7 +48836,7 @@
               <a:t>Intent intent = new Intent(</a:t>
             </a:r>
             <a:r>
-              <a:rPr lang="en" sz="1800" b="1">
+              <a:rPr lang="en" sz="1800" b="1" dirty="0" err="1">
                 <a:solidFill>
                   <a:schemeClr val="dk1"/>
                 </a:solidFill>
@@ -48850,7 +48848,7 @@
               <a:t>Intent.ACTION_CALL_BUTTON</a:t>
             </a:r>
             <a:r>
-              <a:rPr lang="en" sz="1800">
+              <a:rPr lang="en" sz="1800" dirty="0">
                 <a:solidFill>
                   <a:schemeClr val="dk1"/>
                 </a:solidFill>
@@ -48861,7 +48859,7 @@
               </a:rPr>
               <a:t>);	</a:t>
             </a:r>
-            <a:endParaRPr sz="1800">
+            <a:endParaRPr sz="1800" dirty="0">
               <a:solidFill>
                 <a:schemeClr val="dk1"/>
               </a:solidFill>
@@ -48882,7 +48880,7 @@
               <a:buNone/>
             </a:pPr>
             <a:r>
-              <a:rPr lang="en" sz="2400">
+              <a:rPr lang="en" sz="2400" dirty="0">
                 <a:latin typeface="Roboto"/>
                 <a:ea typeface="Roboto"/>
                 <a:cs typeface="Roboto"/>
@@ -48891,7 +48889,7 @@
               <a:t>User has pressed Call button — start Activity that can make a call (no data is passed in or returned</a:t>
             </a:r>
             <a:r>
-              <a:rPr lang="en" sz="1800">
+              <a:rPr lang="en" sz="1800" dirty="0">
                 <a:latin typeface="Roboto"/>
                 <a:ea typeface="Roboto"/>
                 <a:cs typeface="Roboto"/>
@@ -48899,7 +48897,7 @@
               </a:rPr>
               <a:t>)</a:t>
             </a:r>
-            <a:endParaRPr sz="1800">
+            <a:endParaRPr sz="1800" dirty="0">
               <a:latin typeface="Roboto"/>
               <a:ea typeface="Roboto"/>
               <a:cs typeface="Roboto"/>
@@ -48916,7 +48914,7 @@
               </a:spcAft>
               <a:buNone/>
             </a:pPr>
-            <a:endParaRPr sz="1800">
+            <a:endParaRPr sz="1800" dirty="0">
               <a:latin typeface="Roboto"/>
               <a:ea typeface="Roboto"/>
               <a:cs typeface="Roboto"/>
@@ -48924,7 +48922,7 @@
             </a:endParaRPr>
           </a:p>
           <a:p>
-            <a:pPr marL="457200" lvl="0" indent="-381000" algn="l" rtl="0">
+            <a:pPr marL="533400" lvl="0" indent="-457200" algn="l" rtl="0">
               <a:spcBef>
                 <a:spcPts val="0"/>
               </a:spcBef>
@@ -48932,19 +48930,27 @@
                 <a:spcPts val="0"/>
               </a:spcAft>
               <a:buSzPts val="2400"/>
-              <a:buFont typeface="Roboto"/>
-              <a:buAutoNum type="arabicPeriod"/>
+              <a:buFont typeface="+mj-lt"/>
+              <a:buAutoNum type="arabicPeriod" startAt="2"/>
             </a:pPr>
             <a:r>
-              <a:rPr lang="en" sz="2400">
+              <a:rPr lang="en" sz="2400" dirty="0">
+                <a:latin typeface="Roboto"/>
+                <a:ea typeface="Roboto"/>
+                <a:sym typeface="Roboto"/>
+              </a:rPr>
+              <a:t>Start</a:t>
+            </a:r>
+            <a:r>
+              <a:rPr lang="en" sz="2400" dirty="0">
                 <a:latin typeface="Roboto"/>
                 <a:ea typeface="Roboto"/>
                 <a:cs typeface="Roboto"/>
                 <a:sym typeface="Roboto"/>
               </a:rPr>
-              <a:t>Start the Activity</a:t>
+              <a:t> the Activity</a:t>
             </a:r>
-            <a:endParaRPr sz="2400">
+            <a:endParaRPr sz="2400" dirty="0">
               <a:latin typeface="Roboto"/>
               <a:ea typeface="Roboto"/>
               <a:cs typeface="Roboto"/>
@@ -48965,7 +48971,7 @@
               <a:buNone/>
             </a:pPr>
             <a:r>
-              <a:rPr lang="en" sz="1800">
+              <a:rPr lang="en" sz="1800" dirty="0">
                 <a:solidFill>
                   <a:schemeClr val="dk1"/>
                 </a:solidFill>
@@ -48974,10 +48980,58 @@
                 <a:cs typeface="Consolas"/>
                 <a:sym typeface="Consolas"/>
               </a:rPr>
-              <a:t>    if (intent.resolveActivity(getPackageManager()) != null) {</a:t>
+              <a:t>    if (</a:t>
+            </a:r>
+            <a:r>
+              <a:rPr lang="en" sz="1800" dirty="0" err="1">
+                <a:solidFill>
+                  <a:schemeClr val="dk1"/>
+                </a:solidFill>
+                <a:latin typeface="Consolas"/>
+                <a:ea typeface="Consolas"/>
+                <a:cs typeface="Consolas"/>
+                <a:sym typeface="Consolas"/>
+              </a:rPr>
+              <a:t>intent.resolveActivity</a:t>
+            </a:r>
+            <a:r>
+              <a:rPr lang="en" sz="1800" dirty="0">
+                <a:solidFill>
+                  <a:schemeClr val="dk1"/>
+                </a:solidFill>
+                <a:latin typeface="Consolas"/>
+                <a:ea typeface="Consolas"/>
+                <a:cs typeface="Consolas"/>
+                <a:sym typeface="Consolas"/>
+              </a:rPr>
+              <a:t>(</a:t>
+            </a:r>
+            <a:r>
+              <a:rPr lang="en" sz="1800" dirty="0" err="1">
+                <a:solidFill>
+                  <a:schemeClr val="dk1"/>
+                </a:solidFill>
+                <a:latin typeface="Consolas"/>
+                <a:ea typeface="Consolas"/>
+                <a:cs typeface="Consolas"/>
+                <a:sym typeface="Consolas"/>
+              </a:rPr>
+              <a:t>getPackageManager</a:t>
+            </a:r>
+            <a:r>
+              <a:rPr lang="en" sz="1800" dirty="0">
+                <a:solidFill>
+                  <a:schemeClr val="dk1"/>
+                </a:solidFill>
+                <a:latin typeface="Consolas"/>
+                <a:ea typeface="Consolas"/>
+                <a:cs typeface="Consolas"/>
+                <a:sym typeface="Consolas"/>
+              </a:rPr>
+              <a:t>()) != null) {</a:t>
             </a:r>
             <a:br>
-              <a:rPr lang="en" sz="1800">
+              <a:rPr lang="en" sz="1800" dirty="0">
                 <a:solidFill>
                   <a:schemeClr val="dk1"/>
                 </a:solidFill>
@@ -48988,7 +49042,7 @@
               </a:rPr>
             </a:br>
             <a:r>
-              <a:rPr lang="en" sz="1800">
+              <a:rPr lang="en" sz="1800" dirty="0">
                 <a:solidFill>
                   <a:schemeClr val="dk1"/>
                 </a:solidFill>
@@ -48997,10 +49051,34 @@
                 <a:cs typeface="Consolas"/>
                 <a:sym typeface="Consolas"/>
               </a:rPr>
-              <a:t>        startActivity(intent);</a:t>
+              <a:t>        </a:t>
+            </a:r>
+            <a:r>
+              <a:rPr lang="en" sz="1800" dirty="0" err="1">
+                <a:solidFill>
+                  <a:schemeClr val="dk1"/>
+                </a:solidFill>
+                <a:latin typeface="Consolas"/>
+                <a:ea typeface="Consolas"/>
+                <a:cs typeface="Consolas"/>
+                <a:sym typeface="Consolas"/>
+              </a:rPr>
+              <a:t>startActivity</a:t>
+            </a:r>
+            <a:r>
+              <a:rPr lang="en" sz="1800" dirty="0">
+                <a:solidFill>
+                  <a:schemeClr val="dk1"/>
+                </a:solidFill>
+                <a:latin typeface="Consolas"/>
+                <a:ea typeface="Consolas"/>
+                <a:cs typeface="Consolas"/>
+                <a:sym typeface="Consolas"/>
+              </a:rPr>
+              <a:t>(intent);</a:t>
             </a:r>
             <a:br>
-              <a:rPr lang="en" sz="1800">
+              <a:rPr lang="en" sz="1800" dirty="0">
                 <a:solidFill>
                   <a:schemeClr val="dk1"/>
                 </a:solidFill>
@@ -49011,7 +49089,7 @@
               </a:rPr>
             </a:br>
             <a:r>
-              <a:rPr lang="en" sz="1800">
+              <a:rPr lang="en" sz="1800" dirty="0">
                 <a:solidFill>
                   <a:schemeClr val="dk1"/>
                 </a:solidFill>
@@ -49022,7 +49100,7 @@
               </a:rPr>
               <a:t>    }</a:t>
             </a:r>
-            <a:endParaRPr sz="1600">
+            <a:endParaRPr sz="1600" dirty="0">
               <a:latin typeface="Consolas"/>
               <a:ea typeface="Consolas"/>
               <a:cs typeface="Consolas"/>
@@ -49287,19 +49365,7 @@
                 <a:cs typeface="Consolas"/>
                 <a:sym typeface="Consolas"/>
               </a:rPr>
-              <a:t>Intent </a:t>
-            </a:r>
-            <a:r>
-              <a:rPr lang="en" sz="1800" smtClean="0">
-                <a:solidFill>
-                  <a:srgbClr val="666666"/>
-                </a:solidFill>
-                <a:latin typeface="Consolas"/>
-                <a:ea typeface="Consolas"/>
-                <a:cs typeface="Consolas"/>
-                <a:sym typeface="Consolas"/>
-              </a:rPr>
-              <a:t>intent </a:t>
+              <a:t>Intent intent </a:t>
             </a:r>
             <a:r>
               <a:rPr lang="en" sz="1800" dirty="0">
@@ -49370,15 +49436,6 @@
                 <a:sym typeface="Consolas"/>
               </a:rPr>
               <a:t>startActivity(intent);</a:t>
-            </a:r>
-            <a:r>
-              <a:rPr lang="en" sz="2000" b="1" dirty="0">
-                <a:latin typeface="Consolas"/>
-                <a:ea typeface="Consolas"/>
-                <a:cs typeface="Consolas"/>
-                <a:sym typeface="Consolas"/>
-              </a:rPr>
-              <a:t/>
             </a:r>
             <a:br>
               <a:rPr lang="en" sz="2000" b="1" dirty="0">
@@ -49563,7 +49620,7 @@
               <a:buAutoNum type="arabicPeriod"/>
             </a:pPr>
             <a:r>
-              <a:rPr lang="en" sz="2400">
+              <a:rPr lang="en" sz="2400" dirty="0">
                 <a:latin typeface="Roboto"/>
                 <a:ea typeface="Roboto"/>
                 <a:cs typeface="Roboto"/>
@@ -49571,7 +49628,7 @@
               </a:rPr>
               <a:t>Create an Intent for action</a:t>
             </a:r>
-            <a:endParaRPr sz="2400">
+            <a:endParaRPr sz="2400" dirty="0">
               <a:latin typeface="Roboto"/>
               <a:ea typeface="Roboto"/>
               <a:cs typeface="Roboto"/>
@@ -49592,7 +49649,7 @@
               <a:buNone/>
             </a:pPr>
             <a:r>
-              <a:rPr lang="en" sz="1800">
+              <a:rPr lang="en" sz="1800" dirty="0">
                 <a:solidFill>
                   <a:schemeClr val="dk1"/>
                 </a:solidFill>
@@ -49604,7 +49661,7 @@
               <a:t>Intent intent = new Intent(</a:t>
             </a:r>
             <a:r>
-              <a:rPr lang="en" sz="1800" b="1">
+              <a:rPr lang="en" sz="1800" b="1" dirty="0" err="1">
                 <a:solidFill>
                   <a:schemeClr val="dk1"/>
                 </a:solidFill>
@@ -49616,7 +49673,7 @@
               <a:t>Intent.ACTION_DIAL</a:t>
             </a:r>
             <a:r>
-              <a:rPr lang="en" sz="1800">
+              <a:rPr lang="en" sz="1800" dirty="0">
                 <a:solidFill>
                   <a:schemeClr val="dk1"/>
                 </a:solidFill>
@@ -49627,7 +49684,7 @@
               </a:rPr>
               <a:t>);</a:t>
             </a:r>
-            <a:endParaRPr sz="2400">
+            <a:endParaRPr sz="2400" dirty="0">
               <a:latin typeface="Roboto"/>
               <a:ea typeface="Roboto"/>
               <a:cs typeface="Roboto"/>
@@ -49635,7 +49692,7 @@
             </a:endParaRPr>
           </a:p>
           <a:p>
-            <a:pPr marL="457200" lvl="0" indent="-381000" algn="l" rtl="0">
+            <a:pPr marL="533400" lvl="0" indent="-457200" algn="l" rtl="0">
               <a:spcBef>
                 <a:spcPts val="1000"/>
               </a:spcBef>
@@ -49643,11 +49700,11 @@
                 <a:spcPts val="0"/>
               </a:spcAft>
               <a:buSzPts val="2400"/>
-              <a:buFont typeface="Roboto"/>
-              <a:buAutoNum type="arabicPeriod"/>
+              <a:buFont typeface="+mj-lt"/>
+              <a:buAutoNum type="arabicPeriod" startAt="2"/>
             </a:pPr>
             <a:r>
-              <a:rPr lang="en" sz="2400">
+              <a:rPr lang="en" sz="2400" dirty="0">
                 <a:latin typeface="Roboto"/>
                 <a:ea typeface="Roboto"/>
                 <a:cs typeface="Roboto"/>
@@ -49655,7 +49712,7 @@
               </a:rPr>
               <a:t>Provide data as a URI</a:t>
             </a:r>
-            <a:endParaRPr sz="2400">
+            <a:endParaRPr sz="2400" dirty="0">
               <a:latin typeface="Roboto"/>
               <a:ea typeface="Roboto"/>
               <a:cs typeface="Roboto"/>
@@ -49676,7 +49733,7 @@
               <a:buNone/>
             </a:pPr>
             <a:r>
-              <a:rPr lang="en" sz="1800">
+              <a:rPr lang="en" sz="1800" dirty="0" err="1">
                 <a:solidFill>
                   <a:schemeClr val="dk1"/>
                 </a:solidFill>
@@ -49685,10 +49742,10 @@
                 <a:cs typeface="Consolas"/>
                 <a:sym typeface="Consolas"/>
               </a:rPr>
-              <a:t>intent.setData(</a:t>
+              <a:t>intent.setData</a:t>
             </a:r>
             <a:r>
-              <a:rPr lang="en" sz="1800" b="1">
+              <a:rPr lang="en" sz="1800" dirty="0">
                 <a:solidFill>
                   <a:schemeClr val="dk1"/>
                 </a:solidFill>
@@ -49697,10 +49754,34 @@
                 <a:cs typeface="Consolas"/>
                 <a:sym typeface="Consolas"/>
               </a:rPr>
-              <a:t>Uri.parse("tel:8005551234")</a:t>
+              <a:t>(</a:t>
             </a:r>
             <a:r>
-              <a:rPr lang="en" sz="1800">
+              <a:rPr lang="en" sz="1800" b="1" dirty="0" err="1">
+                <a:solidFill>
+                  <a:schemeClr val="dk1"/>
+                </a:solidFill>
+                <a:latin typeface="Consolas"/>
+                <a:ea typeface="Consolas"/>
+                <a:cs typeface="Consolas"/>
+                <a:sym typeface="Consolas"/>
+              </a:rPr>
+              <a:t>Uri.parse</a:t>
+            </a:r>
+            <a:r>
+              <a:rPr lang="en" sz="1800" b="1" dirty="0">
+                <a:solidFill>
+                  <a:schemeClr val="dk1"/>
+                </a:solidFill>
+                <a:latin typeface="Consolas"/>
+                <a:ea typeface="Consolas"/>
+                <a:cs typeface="Consolas"/>
+                <a:sym typeface="Consolas"/>
+              </a:rPr>
+              <a:t>("tel:8005551234")</a:t>
+            </a:r>
+            <a:r>
+              <a:rPr lang="en" sz="1800" dirty="0">
                 <a:solidFill>
                   <a:schemeClr val="dk1"/>
                 </a:solidFill>
@@ -49711,7 +49792,7 @@
               </a:rPr>
               <a:t>);</a:t>
             </a:r>
-            <a:endParaRPr sz="2400">
+            <a:endParaRPr sz="2400" dirty="0">
               <a:latin typeface="Roboto"/>
               <a:ea typeface="Roboto"/>
               <a:cs typeface="Roboto"/>
@@ -49719,7 +49800,7 @@
             </a:endParaRPr>
           </a:p>
           <a:p>
-            <a:pPr marL="457200" lvl="0" indent="-381000" algn="l" rtl="0">
+            <a:pPr marL="533400" lvl="0" indent="-457200" algn="l" rtl="0">
               <a:spcBef>
                 <a:spcPts val="1000"/>
               </a:spcBef>
@@ -49727,11 +49808,11 @@
                 <a:spcPts val="0"/>
               </a:spcAft>
               <a:buSzPts val="2400"/>
-              <a:buFont typeface="Roboto"/>
-              <a:buAutoNum type="arabicPeriod"/>
+              <a:buFont typeface="+mj-lt"/>
+              <a:buAutoNum type="arabicPeriod" startAt="3"/>
             </a:pPr>
             <a:r>
-              <a:rPr lang="en" sz="2400">
+              <a:rPr lang="en" sz="2400" dirty="0">
                 <a:latin typeface="Roboto"/>
                 <a:ea typeface="Roboto"/>
                 <a:cs typeface="Roboto"/>
@@ -49739,7 +49820,7 @@
               </a:rPr>
               <a:t>Start the Activity</a:t>
             </a:r>
-            <a:endParaRPr sz="2400">
+            <a:endParaRPr sz="2400" dirty="0">
               <a:latin typeface="Roboto"/>
               <a:ea typeface="Roboto"/>
               <a:cs typeface="Roboto"/>
@@ -49760,7 +49841,7 @@
               <a:buNone/>
             </a:pPr>
             <a:r>
-              <a:rPr lang="en" sz="1800">
+              <a:rPr lang="en" sz="1800" dirty="0">
                 <a:solidFill>
                   <a:schemeClr val="dk1"/>
                 </a:solidFill>
@@ -49769,10 +49850,58 @@
                 <a:cs typeface="Consolas"/>
                 <a:sym typeface="Consolas"/>
               </a:rPr>
-              <a:t>if (intent.resolveActivity(getPackageManager()) != null) {</a:t>
+              <a:t>if (</a:t>
+            </a:r>
+            <a:r>
+              <a:rPr lang="en" sz="1800" dirty="0" err="1">
+                <a:solidFill>
+                  <a:schemeClr val="dk1"/>
+                </a:solidFill>
+                <a:latin typeface="Consolas"/>
+                <a:ea typeface="Consolas"/>
+                <a:cs typeface="Consolas"/>
+                <a:sym typeface="Consolas"/>
+              </a:rPr>
+              <a:t>intent.resolveActivity</a:t>
+            </a:r>
+            <a:r>
+              <a:rPr lang="en" sz="1800" dirty="0">
+                <a:solidFill>
+                  <a:schemeClr val="dk1"/>
+                </a:solidFill>
+                <a:latin typeface="Consolas"/>
+                <a:ea typeface="Consolas"/>
+                <a:cs typeface="Consolas"/>
+                <a:sym typeface="Consolas"/>
+              </a:rPr>
+              <a:t>(</a:t>
+            </a:r>
+            <a:r>
+              <a:rPr lang="en" sz="1800" dirty="0" err="1">
+                <a:solidFill>
+                  <a:schemeClr val="dk1"/>
+                </a:solidFill>
+                <a:latin typeface="Consolas"/>
+                <a:ea typeface="Consolas"/>
+                <a:cs typeface="Consolas"/>
+                <a:sym typeface="Consolas"/>
+              </a:rPr>
+              <a:t>getPackageManager</a:t>
+            </a:r>
+            <a:r>
+              <a:rPr lang="en" sz="1800" dirty="0">
+                <a:solidFill>
+                  <a:schemeClr val="dk1"/>
+                </a:solidFill>
+                <a:latin typeface="Consolas"/>
+                <a:ea typeface="Consolas"/>
+                <a:cs typeface="Consolas"/>
+                <a:sym typeface="Consolas"/>
+              </a:rPr>
+              <a:t>()) != null) {</a:t>
             </a:r>
             <a:br>
-              <a:rPr lang="en" sz="1800">
+              <a:rPr lang="en" sz="1800" dirty="0">
                 <a:solidFill>
                   <a:schemeClr val="dk1"/>
                 </a:solidFill>
@@ -49783,7 +49912,7 @@
               </a:rPr>
             </a:br>
             <a:r>
-              <a:rPr lang="en" sz="1800">
+              <a:rPr lang="en" sz="1800" dirty="0">
                 <a:solidFill>
                   <a:schemeClr val="dk1"/>
                 </a:solidFill>
@@ -49792,10 +49921,34 @@
                 <a:cs typeface="Consolas"/>
                 <a:sym typeface="Consolas"/>
               </a:rPr>
-              <a:t>    startActivity(intent);</a:t>
+              <a:t>    </a:t>
+            </a:r>
+            <a:r>
+              <a:rPr lang="en" sz="1800" dirty="0" err="1">
+                <a:solidFill>
+                  <a:schemeClr val="dk1"/>
+                </a:solidFill>
+                <a:latin typeface="Consolas"/>
+                <a:ea typeface="Consolas"/>
+                <a:cs typeface="Consolas"/>
+                <a:sym typeface="Consolas"/>
+              </a:rPr>
+              <a:t>startActivity</a:t>
+            </a:r>
+            <a:r>
+              <a:rPr lang="en" sz="1800" dirty="0">
+                <a:solidFill>
+                  <a:schemeClr val="dk1"/>
+                </a:solidFill>
+                <a:latin typeface="Consolas"/>
+                <a:ea typeface="Consolas"/>
+                <a:cs typeface="Consolas"/>
+                <a:sym typeface="Consolas"/>
+              </a:rPr>
+              <a:t>(intent);</a:t>
             </a:r>
             <a:br>
-              <a:rPr lang="en" sz="1800">
+              <a:rPr lang="en" sz="1800" dirty="0">
                 <a:solidFill>
                   <a:schemeClr val="dk1"/>
                 </a:solidFill>
@@ -49806,7 +49959,7 @@
               </a:rPr>
             </a:br>
             <a:r>
-              <a:rPr lang="en" sz="1800">
+              <a:rPr lang="en" sz="1800" dirty="0">
                 <a:solidFill>
                   <a:schemeClr val="dk1"/>
                 </a:solidFill>
@@ -49817,7 +49970,7 @@
               </a:rPr>
               <a:t>}</a:t>
             </a:r>
-            <a:endParaRPr sz="1600">
+            <a:endParaRPr sz="1600" dirty="0">
               <a:latin typeface="Consolas"/>
               <a:ea typeface="Consolas"/>
               <a:cs typeface="Consolas"/>
@@ -50747,7 +50900,7 @@
               <a:buAutoNum type="arabicPeriod"/>
             </a:pPr>
             <a:r>
-              <a:rPr lang="en" sz="2400">
+              <a:rPr lang="en" sz="2400" dirty="0">
                 <a:latin typeface="Roboto"/>
                 <a:ea typeface="Roboto"/>
                 <a:cs typeface="Roboto"/>
@@ -50755,7 +50908,7 @@
               </a:rPr>
               <a:t>Create an Intent for an action</a:t>
             </a:r>
-            <a:endParaRPr sz="2400">
+            <a:endParaRPr sz="2400" dirty="0">
               <a:latin typeface="Roboto"/>
               <a:ea typeface="Roboto"/>
               <a:cs typeface="Roboto"/>
@@ -50776,7 +50929,7 @@
               <a:buNone/>
             </a:pPr>
             <a:r>
-              <a:rPr lang="en" sz="1800">
+              <a:rPr lang="en" sz="1800" dirty="0">
                 <a:solidFill>
                   <a:schemeClr val="dk1"/>
                 </a:solidFill>
@@ -50788,7 +50941,7 @@
               <a:t>Intent intent = new Intent(</a:t>
             </a:r>
             <a:r>
-              <a:rPr lang="en" sz="1800" b="1">
+              <a:rPr lang="en" sz="1800" b="1" dirty="0" err="1">
                 <a:solidFill>
                   <a:schemeClr val="dk1"/>
                 </a:solidFill>
@@ -50800,7 +50953,7 @@
               <a:t>Intent.ACTION_WEB_SEARCH</a:t>
             </a:r>
             <a:r>
-              <a:rPr lang="en" sz="1800">
+              <a:rPr lang="en" sz="1800" dirty="0">
                 <a:solidFill>
                   <a:schemeClr val="dk1"/>
                 </a:solidFill>
@@ -50811,7 +50964,7 @@
               </a:rPr>
               <a:t>);</a:t>
             </a:r>
-            <a:endParaRPr sz="2400">
+            <a:endParaRPr sz="2400" dirty="0">
               <a:latin typeface="Roboto"/>
               <a:ea typeface="Roboto"/>
               <a:cs typeface="Roboto"/>
@@ -50819,7 +50972,7 @@
             </a:endParaRPr>
           </a:p>
           <a:p>
-            <a:pPr marL="457200" lvl="0" indent="-381000" algn="l" rtl="0">
+            <a:pPr marL="533400" lvl="0" indent="-457200" algn="l" rtl="0">
               <a:spcBef>
                 <a:spcPts val="1000"/>
               </a:spcBef>
@@ -50827,11 +50980,11 @@
                 <a:spcPts val="0"/>
               </a:spcAft>
               <a:buSzPts val="2400"/>
-              <a:buFont typeface="Roboto"/>
-              <a:buAutoNum type="arabicPeriod"/>
+              <a:buFont typeface="+mj-lt"/>
+              <a:buAutoNum type="arabicPeriod" startAt="2"/>
             </a:pPr>
             <a:r>
-              <a:rPr lang="en" sz="2400">
+              <a:rPr lang="en" sz="2400" dirty="0">
                 <a:latin typeface="Roboto"/>
                 <a:ea typeface="Roboto"/>
                 <a:cs typeface="Roboto"/>
@@ -50839,7 +50992,7 @@
               </a:rPr>
               <a:t>Put extras</a:t>
             </a:r>
-            <a:endParaRPr sz="2400">
+            <a:endParaRPr sz="2400" dirty="0">
               <a:latin typeface="Roboto"/>
               <a:ea typeface="Roboto"/>
               <a:cs typeface="Roboto"/>
@@ -50860,7 +51013,7 @@
               <a:buNone/>
             </a:pPr>
             <a:r>
-              <a:rPr lang="en" sz="1800">
+              <a:rPr lang="en" sz="1800" dirty="0">
                 <a:latin typeface="Consolas"/>
                 <a:ea typeface="Consolas"/>
                 <a:cs typeface="Consolas"/>
@@ -50869,7 +51022,7 @@
               <a:t>String</a:t>
             </a:r>
             <a:r>
-              <a:rPr lang="en" sz="1800">
+              <a:rPr lang="en" sz="1800" dirty="0">
                 <a:solidFill>
                   <a:srgbClr val="303336"/>
                 </a:solidFill>
@@ -50878,9 +51031,57 @@
                 <a:cs typeface="Consolas"/>
                 <a:sym typeface="Consolas"/>
               </a:rPr>
-              <a:t> query = edittext.getText().toString();</a:t>
+              <a:t> query = </a:t>
             </a:r>
-            <a:endParaRPr sz="1800">
+            <a:r>
+              <a:rPr lang="en" sz="1800" dirty="0" err="1">
+                <a:solidFill>
+                  <a:srgbClr val="303336"/>
+                </a:solidFill>
+                <a:latin typeface="Consolas"/>
+                <a:ea typeface="Consolas"/>
+                <a:cs typeface="Consolas"/>
+                <a:sym typeface="Consolas"/>
+              </a:rPr>
+              <a:t>edittext.getText</a:t>
+            </a:r>
+            <a:r>
+              <a:rPr lang="en" sz="1800" dirty="0">
+                <a:solidFill>
+                  <a:srgbClr val="303336"/>
+                </a:solidFill>
+                <a:latin typeface="Consolas"/>
+                <a:ea typeface="Consolas"/>
+                <a:cs typeface="Consolas"/>
+                <a:sym typeface="Consolas"/>
+              </a:rPr>
+              <a:t>().</a:t>
+            </a:r>
+            <a:r>
+              <a:rPr lang="en" sz="1800" dirty="0" err="1">
+                <a:solidFill>
+                  <a:srgbClr val="303336"/>
+                </a:solidFill>
+                <a:latin typeface="Consolas"/>
+                <a:ea typeface="Consolas"/>
+                <a:cs typeface="Consolas"/>
+                <a:sym typeface="Consolas"/>
+              </a:rPr>
+              <a:t>toString</a:t>
+            </a:r>
+            <a:r>
+              <a:rPr lang="en" sz="1800" dirty="0">
+                <a:solidFill>
+                  <a:srgbClr val="303336"/>
+                </a:solidFill>
+                <a:latin typeface="Consolas"/>
+                <a:ea typeface="Consolas"/>
+                <a:cs typeface="Consolas"/>
+                <a:sym typeface="Consolas"/>
+              </a:rPr>
+              <a:t>();</a:t>
+            </a:r>
+            <a:endParaRPr sz="1800" dirty="0">
               <a:solidFill>
                 <a:srgbClr val="303336"/>
               </a:solidFill>
@@ -50904,7 +51105,7 @@
               <a:buNone/>
             </a:pPr>
             <a:r>
-              <a:rPr lang="en" sz="1800">
+              <a:rPr lang="en" sz="1800" dirty="0" err="1">
                 <a:solidFill>
                   <a:schemeClr val="dk1"/>
                 </a:solidFill>
@@ -50913,10 +51114,22 @@
                 <a:cs typeface="Consolas"/>
                 <a:sym typeface="Consolas"/>
               </a:rPr>
-              <a:t>intent.putExtra(</a:t>
+              <a:t>intent.putExtra</a:t>
             </a:r>
             <a:r>
-              <a:rPr lang="en" sz="1800">
+              <a:rPr lang="en" sz="1800" dirty="0">
+                <a:solidFill>
+                  <a:schemeClr val="dk1"/>
+                </a:solidFill>
+                <a:latin typeface="Consolas"/>
+                <a:ea typeface="Consolas"/>
+                <a:cs typeface="Consolas"/>
+                <a:sym typeface="Consolas"/>
+              </a:rPr>
+              <a:t>(</a:t>
+            </a:r>
+            <a:r>
+              <a:rPr lang="en" sz="1800" dirty="0" err="1">
                 <a:latin typeface="Consolas"/>
                 <a:ea typeface="Consolas"/>
                 <a:cs typeface="Consolas"/>
@@ -50925,7 +51138,7 @@
               <a:t>SearchManager.</a:t>
             </a:r>
             <a:r>
-              <a:rPr lang="en" sz="1800">
+              <a:rPr lang="en" sz="1800" dirty="0" err="1">
                 <a:solidFill>
                   <a:srgbClr val="303336"/>
                 </a:solidFill>
@@ -50934,10 +51147,22 @@
                 <a:cs typeface="Consolas"/>
                 <a:sym typeface="Consolas"/>
               </a:rPr>
-              <a:t>QUERY, query)</a:t>
+              <a:t>QUERY</a:t>
             </a:r>
             <a:r>
-              <a:rPr lang="en" sz="1800">
+              <a:rPr lang="en" sz="1800" dirty="0">
+                <a:solidFill>
+                  <a:srgbClr val="303336"/>
+                </a:solidFill>
+                <a:latin typeface="Consolas"/>
+                <a:ea typeface="Consolas"/>
+                <a:cs typeface="Consolas"/>
+                <a:sym typeface="Consolas"/>
+              </a:rPr>
+              <a:t>, query)</a:t>
+            </a:r>
+            <a:r>
+              <a:rPr lang="en" sz="1800" dirty="0">
                 <a:solidFill>
                   <a:schemeClr val="dk1"/>
                 </a:solidFill>
@@ -50948,7 +51173,7 @@
               </a:rPr>
               <a:t>);</a:t>
             </a:r>
-            <a:endParaRPr sz="1800">
+            <a:endParaRPr sz="1800" dirty="0">
               <a:latin typeface="Roboto"/>
               <a:ea typeface="Roboto"/>
               <a:cs typeface="Roboto"/>
@@ -50956,7 +51181,7 @@
             </a:endParaRPr>
           </a:p>
           <a:p>
-            <a:pPr marL="457200" lvl="0" indent="-381000" algn="l" rtl="0">
+            <a:pPr marL="533400" lvl="0" indent="-457200" algn="l" rtl="0">
               <a:spcBef>
                 <a:spcPts val="1000"/>
               </a:spcBef>
@@ -50964,11 +51189,11 @@
                 <a:spcPts val="0"/>
               </a:spcAft>
               <a:buSzPts val="2400"/>
-              <a:buFont typeface="Roboto"/>
-              <a:buAutoNum type="arabicPeriod"/>
+              <a:buFont typeface="+mj-lt"/>
+              <a:buAutoNum type="arabicPeriod" startAt="3"/>
             </a:pPr>
             <a:r>
-              <a:rPr lang="en" sz="2400">
+              <a:rPr lang="en" sz="2400" dirty="0">
                 <a:latin typeface="Roboto"/>
                 <a:ea typeface="Roboto"/>
                 <a:cs typeface="Roboto"/>
@@ -50976,7 +51201,7 @@
               </a:rPr>
               <a:t>Start the Activity</a:t>
             </a:r>
-            <a:endParaRPr sz="2400">
+            <a:endParaRPr sz="2400" dirty="0">
               <a:latin typeface="Roboto"/>
               <a:ea typeface="Roboto"/>
               <a:cs typeface="Roboto"/>
@@ -50997,7 +51222,7 @@
               <a:buNone/>
             </a:pPr>
             <a:r>
-              <a:rPr lang="en" sz="1800">
+              <a:rPr lang="en" sz="1800" dirty="0">
                 <a:solidFill>
                   <a:schemeClr val="dk1"/>
                 </a:solidFill>
@@ -51006,10 +51231,58 @@
                 <a:cs typeface="Consolas"/>
                 <a:sym typeface="Consolas"/>
               </a:rPr>
-              <a:t>    if (intent.resolveActivity(getPackageManager()) != null) {</a:t>
+              <a:t>    if (</a:t>
+            </a:r>
+            <a:r>
+              <a:rPr lang="en" sz="1800" dirty="0" err="1">
+                <a:solidFill>
+                  <a:schemeClr val="dk1"/>
+                </a:solidFill>
+                <a:latin typeface="Consolas"/>
+                <a:ea typeface="Consolas"/>
+                <a:cs typeface="Consolas"/>
+                <a:sym typeface="Consolas"/>
+              </a:rPr>
+              <a:t>intent.resolveActivity</a:t>
+            </a:r>
+            <a:r>
+              <a:rPr lang="en" sz="1800" dirty="0">
+                <a:solidFill>
+                  <a:schemeClr val="dk1"/>
+                </a:solidFill>
+                <a:latin typeface="Consolas"/>
+                <a:ea typeface="Consolas"/>
+                <a:cs typeface="Consolas"/>
+                <a:sym typeface="Consolas"/>
+              </a:rPr>
+              <a:t>(</a:t>
+            </a:r>
+            <a:r>
+              <a:rPr lang="en" sz="1800" dirty="0" err="1">
+                <a:solidFill>
+                  <a:schemeClr val="dk1"/>
+                </a:solidFill>
+                <a:latin typeface="Consolas"/>
+                <a:ea typeface="Consolas"/>
+                <a:cs typeface="Consolas"/>
+                <a:sym typeface="Consolas"/>
+              </a:rPr>
+              <a:t>getPackageManager</a:t>
+            </a:r>
+            <a:r>
+              <a:rPr lang="en" sz="1800" dirty="0">
+                <a:solidFill>
+                  <a:schemeClr val="dk1"/>
+                </a:solidFill>
+                <a:latin typeface="Consolas"/>
+                <a:ea typeface="Consolas"/>
+                <a:cs typeface="Consolas"/>
+                <a:sym typeface="Consolas"/>
+              </a:rPr>
+              <a:t>()) != null) {</a:t>
             </a:r>
             <a:br>
-              <a:rPr lang="en" sz="1800">
+              <a:rPr lang="en" sz="1800" dirty="0">
                 <a:solidFill>
                   <a:schemeClr val="dk1"/>
                 </a:solidFill>
@@ -51020,7 +51293,7 @@
               </a:rPr>
             </a:br>
             <a:r>
-              <a:rPr lang="en" sz="1800">
+              <a:rPr lang="en" sz="1800" dirty="0">
                 <a:solidFill>
                   <a:schemeClr val="dk1"/>
                 </a:solidFill>
@@ -51029,10 +51302,34 @@
                 <a:cs typeface="Consolas"/>
                 <a:sym typeface="Consolas"/>
               </a:rPr>
-              <a:t>        startActivity(intent);</a:t>
+              <a:t>        </a:t>
+            </a:r>
+            <a:r>
+              <a:rPr lang="en" sz="1800" dirty="0" err="1">
+                <a:solidFill>
+                  <a:schemeClr val="dk1"/>
+                </a:solidFill>
+                <a:latin typeface="Consolas"/>
+                <a:ea typeface="Consolas"/>
+                <a:cs typeface="Consolas"/>
+                <a:sym typeface="Consolas"/>
+              </a:rPr>
+              <a:t>startActivity</a:t>
+            </a:r>
+            <a:r>
+              <a:rPr lang="en" sz="1800" dirty="0">
+                <a:solidFill>
+                  <a:schemeClr val="dk1"/>
+                </a:solidFill>
+                <a:latin typeface="Consolas"/>
+                <a:ea typeface="Consolas"/>
+                <a:cs typeface="Consolas"/>
+                <a:sym typeface="Consolas"/>
+              </a:rPr>
+              <a:t>(intent);</a:t>
             </a:r>
             <a:br>
-              <a:rPr lang="en" sz="1800">
+              <a:rPr lang="en" sz="1800" dirty="0">
                 <a:solidFill>
                   <a:schemeClr val="dk1"/>
                 </a:solidFill>
@@ -51043,7 +51340,7 @@
               </a:rPr>
             </a:br>
             <a:r>
-              <a:rPr lang="en" sz="1800">
+              <a:rPr lang="en" sz="1800" dirty="0">
                 <a:solidFill>
                   <a:schemeClr val="dk1"/>
                 </a:solidFill>
@@ -51054,7 +51351,7 @@
               </a:rPr>
               <a:t>    }</a:t>
             </a:r>
-            <a:endParaRPr sz="1600">
+            <a:endParaRPr sz="1600" dirty="0">
               <a:solidFill>
                 <a:schemeClr val="dk1"/>
               </a:solidFill>
@@ -51077,7 +51374,7 @@
               </a:spcAft>
               <a:buNone/>
             </a:pPr>
-            <a:endParaRPr sz="1800">
+            <a:endParaRPr sz="1800" dirty="0">
               <a:solidFill>
                 <a:schemeClr val="dk1"/>
               </a:solidFill>
@@ -51100,7 +51397,7 @@
               </a:spcAft>
               <a:buNone/>
             </a:pPr>
-            <a:endParaRPr sz="1000">
+            <a:endParaRPr sz="1000" dirty="0">
               <a:solidFill>
                 <a:srgbClr val="303336"/>
               </a:solidFill>
@@ -51126,7 +51423,7 @@
               </a:spcAft>
               <a:buNone/>
             </a:pPr>
-            <a:endParaRPr sz="1800">
+            <a:endParaRPr sz="1800" dirty="0">
               <a:solidFill>
                 <a:schemeClr val="dk1"/>
               </a:solidFill>
@@ -51256,13 +51553,6 @@
   <p:clrMapOvr>
     <a:masterClrMapping/>
   </p:clrMapOvr>
-  <p:timing>
-    <p:tnLst>
-      <p:par>
-        <p:cTn id="1" dur="indefinite" restart="never" nodeType="tmRoot"/>
-      </p:par>
-    </p:tnLst>
-  </p:timing>
 </p:sld>
 </file>
 
@@ -51873,7 +52163,7 @@
               <a:buAutoNum type="arabicPeriod"/>
             </a:pPr>
             <a:r>
-              <a:rPr lang="en" sz="2400">
+              <a:rPr lang="en" sz="2400" dirty="0">
                 <a:latin typeface="Roboto"/>
                 <a:ea typeface="Roboto"/>
                 <a:cs typeface="Roboto"/>
@@ -51881,7 +52171,7 @@
               </a:rPr>
               <a:t>Create an Intent for an action</a:t>
             </a:r>
-            <a:endParaRPr sz="2400">
+            <a:endParaRPr sz="2400" dirty="0">
               <a:latin typeface="Roboto"/>
               <a:ea typeface="Roboto"/>
               <a:cs typeface="Roboto"/>
@@ -51902,7 +52192,7 @@
               <a:buNone/>
             </a:pPr>
             <a:r>
-              <a:rPr lang="en" sz="1800">
+              <a:rPr lang="en" sz="1800" dirty="0">
                 <a:solidFill>
                   <a:schemeClr val="dk1"/>
                 </a:solidFill>
@@ -51914,7 +52204,7 @@
               <a:t>Intent intent = new Intent(</a:t>
             </a:r>
             <a:r>
-              <a:rPr lang="en" sz="1800" b="1">
+              <a:rPr lang="en" sz="1800" b="1" dirty="0" err="1">
                 <a:solidFill>
                   <a:schemeClr val="dk1"/>
                 </a:solidFill>
@@ -51926,7 +52216,7 @@
               <a:t>Intent.</a:t>
             </a:r>
             <a:r>
-              <a:rPr lang="en" sz="1800" b="1" u="sng">
+              <a:rPr lang="en" sz="1800" b="1" u="sng" dirty="0" err="1">
                 <a:solidFill>
                   <a:schemeClr val="hlink"/>
                 </a:solidFill>
@@ -51939,7 +52229,7 @@
               <a:t>ACTION_CREATE_DOCUMENT</a:t>
             </a:r>
             <a:r>
-              <a:rPr lang="en" sz="1800">
+              <a:rPr lang="en" sz="1800" dirty="0">
                 <a:solidFill>
                   <a:schemeClr val="dk1"/>
                 </a:solidFill>
@@ -51950,7 +52240,7 @@
               </a:rPr>
               <a:t>);</a:t>
             </a:r>
-            <a:endParaRPr sz="2400">
+            <a:endParaRPr sz="2400" dirty="0">
               <a:latin typeface="Roboto"/>
               <a:ea typeface="Roboto"/>
               <a:cs typeface="Roboto"/>
@@ -51958,7 +52248,7 @@
             </a:endParaRPr>
           </a:p>
           <a:p>
-            <a:pPr marL="457200" lvl="0" indent="-381000" algn="l" rtl="0">
+            <a:pPr marL="533400" lvl="0" indent="-457200" algn="l" rtl="0">
               <a:spcBef>
                 <a:spcPts val="1000"/>
               </a:spcBef>
@@ -51966,11 +52256,11 @@
                 <a:spcPts val="0"/>
               </a:spcAft>
               <a:buSzPts val="2400"/>
-              <a:buFont typeface="Roboto"/>
-              <a:buAutoNum type="arabicPeriod"/>
+              <a:buFont typeface="+mj-lt"/>
+              <a:buAutoNum type="arabicPeriod" startAt="2"/>
             </a:pPr>
             <a:r>
-              <a:rPr lang="en" sz="2400">
+              <a:rPr lang="en" sz="2400" dirty="0">
                 <a:latin typeface="Roboto"/>
                 <a:ea typeface="Roboto"/>
                 <a:cs typeface="Roboto"/>
@@ -51978,7 +52268,7 @@
               </a:rPr>
               <a:t>Set mime type and category for additional information </a:t>
             </a:r>
-            <a:endParaRPr sz="2400">
+            <a:endParaRPr sz="2400" dirty="0">
               <a:latin typeface="Roboto"/>
               <a:ea typeface="Roboto"/>
               <a:cs typeface="Roboto"/>
@@ -51999,7 +52289,7 @@
               <a:buNone/>
             </a:pPr>
             <a:r>
-              <a:rPr lang="en" sz="1800">
+              <a:rPr lang="en" sz="1800" dirty="0">
                 <a:solidFill>
                   <a:schemeClr val="dk1"/>
                 </a:solidFill>
@@ -52011,10 +52301,25 @@
                 <a:cs typeface="Consolas"/>
                 <a:sym typeface="Consolas"/>
               </a:rPr>
-              <a:t>    intent</a:t>
+              <a:t>    </a:t>
             </a:r>
             <a:r>
-              <a:rPr lang="en" sz="1800">
+              <a:rPr lang="en" sz="1800" dirty="0" err="1">
+                <a:solidFill>
+                  <a:schemeClr val="dk1"/>
+                </a:solidFill>
+                <a:highlight>
+                  <a:srgbClr val="FFFFFF"/>
+                </a:highlight>
+                <a:latin typeface="Consolas"/>
+                <a:ea typeface="Consolas"/>
+                <a:cs typeface="Consolas"/>
+                <a:sym typeface="Consolas"/>
+              </a:rPr>
+              <a:t>intent</a:t>
+            </a:r>
+            <a:r>
+              <a:rPr lang="en" sz="1800" dirty="0" err="1">
                 <a:solidFill>
                   <a:srgbClr val="666600"/>
                 </a:solidFill>
@@ -52029,7 +52334,7 @@
               <a:t>.</a:t>
             </a:r>
             <a:r>
-              <a:rPr lang="en" sz="1800">
+              <a:rPr lang="en" sz="1800" dirty="0" err="1">
                 <a:solidFill>
                   <a:schemeClr val="dk1"/>
                 </a:solidFill>
@@ -52044,7 +52349,7 @@
               <a:t>setType</a:t>
             </a:r>
             <a:r>
-              <a:rPr lang="en" sz="1800">
+              <a:rPr lang="en" sz="1800" dirty="0">
                 <a:solidFill>
                   <a:srgbClr val="666600"/>
                 </a:solidFill>
@@ -52059,7 +52364,7 @@
               <a:t>(</a:t>
             </a:r>
             <a:r>
-              <a:rPr lang="en" sz="1800">
+              <a:rPr lang="en" sz="1800" dirty="0">
                 <a:solidFill>
                   <a:srgbClr val="008800"/>
                 </a:solidFill>
@@ -52074,7 +52379,7 @@
               <a:t>"application/pdf"</a:t>
             </a:r>
             <a:r>
-              <a:rPr lang="en" sz="1800">
+              <a:rPr lang="en" sz="1800" dirty="0">
                 <a:solidFill>
                   <a:srgbClr val="666600"/>
                 </a:solidFill>
@@ -52088,7 +52393,7 @@
               </a:rPr>
               <a:t>); // set MIME type</a:t>
             </a:r>
-            <a:endParaRPr sz="1800">
+            <a:endParaRPr sz="1800" dirty="0">
               <a:solidFill>
                 <a:srgbClr val="666600"/>
               </a:solidFill>
@@ -52115,7 +52420,7 @@
               <a:buNone/>
             </a:pPr>
             <a:r>
-              <a:rPr lang="en" sz="1800">
+              <a:rPr lang="en" sz="1800" dirty="0">
                 <a:solidFill>
                   <a:schemeClr val="dk1"/>
                 </a:solidFill>
@@ -52127,10 +52432,25 @@
                 <a:cs typeface="Consolas"/>
                 <a:sym typeface="Consolas"/>
               </a:rPr>
-              <a:t>    intent</a:t>
+              <a:t>    </a:t>
             </a:r>
             <a:r>
-              <a:rPr lang="en" sz="1800">
+              <a:rPr lang="en" sz="1800" dirty="0" err="1">
+                <a:solidFill>
+                  <a:schemeClr val="dk1"/>
+                </a:solidFill>
+                <a:highlight>
+                  <a:srgbClr val="FFFFFF"/>
+                </a:highlight>
+                <a:latin typeface="Consolas"/>
+                <a:ea typeface="Consolas"/>
+                <a:cs typeface="Consolas"/>
+                <a:sym typeface="Consolas"/>
+              </a:rPr>
+              <a:t>intent</a:t>
+            </a:r>
+            <a:r>
+              <a:rPr lang="en" sz="1800" dirty="0" err="1">
                 <a:solidFill>
                   <a:srgbClr val="666600"/>
                 </a:solidFill>
@@ -52145,7 +52465,7 @@
               <a:t>.</a:t>
             </a:r>
             <a:r>
-              <a:rPr lang="en" sz="1800">
+              <a:rPr lang="en" sz="1800" dirty="0" err="1">
                 <a:solidFill>
                   <a:schemeClr val="dk1"/>
                 </a:solidFill>
@@ -52160,7 +52480,7 @@
               <a:t>addCategory</a:t>
             </a:r>
             <a:r>
-              <a:rPr lang="en" sz="1800">
+              <a:rPr lang="en" sz="1800" dirty="0">
                 <a:solidFill>
                   <a:srgbClr val="666600"/>
                 </a:solidFill>
@@ -52175,7 +52495,7 @@
               <a:t>(</a:t>
             </a:r>
             <a:r>
-              <a:rPr lang="en" sz="1800">
+              <a:rPr lang="en" sz="1800" dirty="0" err="1">
                 <a:solidFill>
                   <a:srgbClr val="660066"/>
                 </a:solidFill>
@@ -52190,7 +52510,7 @@
               <a:t>Intent</a:t>
             </a:r>
             <a:r>
-              <a:rPr lang="en" sz="1800">
+              <a:rPr lang="en" sz="1800" dirty="0" err="1">
                 <a:solidFill>
                   <a:srgbClr val="666600"/>
                 </a:solidFill>
@@ -52205,7 +52525,7 @@
               <a:t>.</a:t>
             </a:r>
             <a:r>
-              <a:rPr lang="en" sz="1800">
+              <a:rPr lang="en" sz="1800" dirty="0" err="1">
                 <a:solidFill>
                   <a:schemeClr val="dk1"/>
                 </a:solidFill>
@@ -52217,9 +52537,24 @@
                 <a:cs typeface="Consolas"/>
                 <a:sym typeface="Consolas"/>
               </a:rPr>
-              <a:t>CATEGORY_OPENABLE); </a:t>
+              <a:t>CATEGORY_OPENABLE</a:t>
             </a:r>
-            <a:endParaRPr sz="1800">
+            <a:r>
+              <a:rPr lang="en" sz="1800" dirty="0">
+                <a:solidFill>
+                  <a:schemeClr val="dk1"/>
+                </a:solidFill>
+                <a:highlight>
+                  <a:srgbClr val="FFFFFF"/>
+                </a:highlight>
+                <a:latin typeface="Consolas"/>
+                <a:ea typeface="Consolas"/>
+                <a:cs typeface="Consolas"/>
+                <a:sym typeface="Consolas"/>
+              </a:rPr>
+              <a:t>); </a:t>
+            </a:r>
+            <a:endParaRPr sz="1800" dirty="0">
               <a:solidFill>
                 <a:schemeClr val="dk1"/>
               </a:solidFill>
@@ -52245,7 +52580,7 @@
               </a:spcAft>
               <a:buNone/>
             </a:pPr>
-            <a:endParaRPr sz="1800">
+            <a:endParaRPr sz="1800" dirty="0">
               <a:solidFill>
                 <a:schemeClr val="dk1"/>
               </a:solidFill>
@@ -52272,7 +52607,7 @@
               <a:buNone/>
             </a:pPr>
             <a:r>
-              <a:rPr lang="en" sz="1800" i="1">
+              <a:rPr lang="en" sz="1800" i="1" dirty="0">
                 <a:solidFill>
                   <a:schemeClr val="dk1"/>
                 </a:solidFill>
@@ -52286,7 +52621,7 @@
               </a:rPr>
               <a:t>continued on next slide...</a:t>
             </a:r>
-            <a:endParaRPr sz="1800" i="1">
+            <a:endParaRPr sz="1800" i="1" dirty="0">
               <a:solidFill>
                 <a:schemeClr val="dk1"/>
               </a:solidFill>
@@ -52312,7 +52647,7 @@
               </a:spcAft>
               <a:buNone/>
             </a:pPr>
-            <a:endParaRPr sz="1800">
+            <a:endParaRPr sz="1800" dirty="0">
               <a:solidFill>
                 <a:schemeClr val="dk1"/>
               </a:solidFill>
@@ -54001,18 +54336,6 @@
                 <a:sym typeface="Consolas"/>
               </a:rPr>
               <a:t>&lt;intent-filter&gt;</a:t>
-            </a:r>
-            <a:r>
-              <a:rPr lang="en" sz="2000" b="1">
-                <a:solidFill>
-                  <a:schemeClr val="dk1"/>
-                </a:solidFill>
-                <a:latin typeface="Consolas"/>
-                <a:ea typeface="Consolas"/>
-                <a:cs typeface="Consolas"/>
-                <a:sym typeface="Consolas"/>
-              </a:rPr>
-              <a:t/>
             </a:r>
             <a:br>
               <a:rPr lang="en" sz="2000" b="1">
@@ -55383,13 +55706,6 @@
   <p:clrMapOvr>
     <a:masterClrMapping/>
   </p:clrMapOvr>
-  <p:timing>
-    <p:tnLst>
-      <p:par>
-        <p:cTn id="1" dur="indefinite" restart="never" nodeType="tmRoot"/>
-      </p:par>
-    </p:tnLst>
-  </p:timing>
 </p:sld>
 </file>
 
@@ -55587,15 +55903,6 @@
                 <a:sym typeface="Consolas"/>
               </a:rPr>
               <a:t>&lt;intent-filter&gt;</a:t>
-            </a:r>
-            <a:r>
-              <a:rPr lang="en" sz="2000">
-                <a:latin typeface="Consolas"/>
-                <a:ea typeface="Consolas"/>
-                <a:cs typeface="Consolas"/>
-                <a:sym typeface="Consolas"/>
-              </a:rPr>
-              <a:t/>
             </a:r>
             <a:br>
               <a:rPr lang="en" sz="2000">
@@ -55690,15 +55997,6 @@
                 <a:sym typeface="Consolas"/>
               </a:rPr>
               <a:t>&lt;intent-filter&gt;</a:t>
-            </a:r>
-            <a:r>
-              <a:rPr lang="en" sz="2000">
-                <a:latin typeface="Consolas"/>
-                <a:ea typeface="Consolas"/>
-                <a:cs typeface="Consolas"/>
-                <a:sym typeface="Consolas"/>
-              </a:rPr>
-              <a:t/>
             </a:r>
             <a:br>
               <a:rPr lang="en" sz="2000">
@@ -55978,18 +56276,6 @@
                 <a:sym typeface="Consolas"/>
               </a:rPr>
               <a:t>&lt;intent-filter&gt;</a:t>
-            </a:r>
-            <a:r>
-              <a:rPr lang="en" sz="2000">
-                <a:solidFill>
-                  <a:schemeClr val="dk1"/>
-                </a:solidFill>
-                <a:latin typeface="Consolas"/>
-                <a:ea typeface="Consolas"/>
-                <a:cs typeface="Consolas"/>
-                <a:sym typeface="Consolas"/>
-              </a:rPr>
-              <a:t/>
             </a:r>
             <a:br>
               <a:rPr lang="en" sz="2000">
@@ -56129,18 +56415,6 @@
               </a:rPr>
               <a:t>&lt;/intent-filter&gt;</a:t>
             </a:r>
-            <a:r>
-              <a:rPr lang="en" sz="1300">
-                <a:solidFill>
-                  <a:schemeClr val="dk1"/>
-                </a:solidFill>
-                <a:latin typeface="Consolas"/>
-                <a:ea typeface="Consolas"/>
-                <a:cs typeface="Consolas"/>
-                <a:sym typeface="Consolas"/>
-              </a:rPr>
-              <a:t/>
-            </a:r>
             <a:br>
               <a:rPr lang="en" sz="1300">
                 <a:solidFill>
@@ -57155,13 +57429,6 @@
   <p:clrMapOvr>
     <a:masterClrMapping/>
   </p:clrMapOvr>
-  <p:timing>
-    <p:tnLst>
-      <p:par>
-        <p:cTn id="1" dur="indefinite" restart="never" nodeType="tmRoot"/>
-      </p:par>
-    </p:tnLst>
-  </p:timing>
 </p:sld>
 </file>
 
@@ -57715,13 +57982,6 @@
   <p:clrMapOvr>
     <a:masterClrMapping/>
   </p:clrMapOvr>
-  <p:timing>
-    <p:tnLst>
-      <p:par>
-        <p:cTn id="1" dur="indefinite" restart="never" nodeType="tmRoot"/>
-      </p:par>
-    </p:tnLst>
-  </p:timing>
 </p:sld>
 </file>
 
@@ -58049,13 +58309,6 @@
   <p:clrMapOvr>
     <a:masterClrMapping/>
   </p:clrMapOvr>
-  <p:timing>
-    <p:tnLst>
-      <p:par>
-        <p:cTn id="1" dur="indefinite" restart="never" nodeType="tmRoot"/>
-      </p:par>
-    </p:tnLst>
-  </p:timing>
 </p:sld>
 </file>
 

</xml_diff>